<commit_message>
Updating slides to move labs to exercises
</commit_message>
<xml_diff>
--- a/slides/08-22-introduction.pptx
+++ b/slides/08-22-introduction.pptx
@@ -3760,7 +3760,7 @@
           <a:p>
             <a:pPr/>
             <a:r>
-              <a:t>Lab 1: Introduction to Google Colab</a:t>
+              <a:t>Exercise 1: Introduction to Google Colab</a:t>
             </a:r>
           </a:p>
         </p:txBody>
@@ -3983,7 +3983,7 @@
       </p:grpSpPr>
       <p:sp>
         <p:nvSpPr>
-          <p:cNvPr id="215" name="Lab 1: Introduction to Google Colab"/>
+          <p:cNvPr id="215" name="Exercise 1: Introduction to Google Colab"/>
           <p:cNvSpPr txBox="1"/>
           <p:nvPr>
             <p:ph type="title"/>
@@ -4000,11 +4000,15 @@
         </p:spPr>
         <p:txBody>
           <a:bodyPr/>
-          <a:lstStyle/>
-          <a:p>
-            <a:pPr/>
-            <a:r>
-              <a:t>Lab 1: Introduction to Google Colab</a:t>
+          <a:lstStyle>
+            <a:lvl1pPr defTabSz="731162">
+              <a:defRPr sz="9968"/>
+            </a:lvl1pPr>
+          </a:lstStyle>
+          <a:p>
+            <a:pPr/>
+            <a:r>
+              <a:t>Exercise 1: Introduction to Google Colab</a:t>
             </a:r>
           </a:p>
         </p:txBody>
@@ -4528,8 +4532,8 @@
       </p:par>
     </p:tnLst>
     <p:bldLst>
+      <p:bldP build="whole" bldLvl="1" animBg="1" rev="0" advAuto="0" spid="183" grpId="2"/>
       <p:bldP build="p" bldLvl="5" animBg="1" rev="0" advAuto="0" spid="182" grpId="1"/>
-      <p:bldP build="whole" bldLvl="1" animBg="1" rev="0" advAuto="0" spid="183" grpId="2"/>
     </p:bldLst>
   </p:timing>
 </p:sld>

</xml_diff>